<commit_message>
module 3 and 4
</commit_message>
<xml_diff>
--- a/slides/ML - Module 3 - Classification - Additional Slides.pptx
+++ b/slides/ML - Module 3 - Classification - Additional Slides.pptx
@@ -5930,31 +5930,6 @@
               <a:t>Support Vector Machines (SVM)</a:t>
             </a:r>
             <a:endParaRPr lang="en-GB" sz="2800" dirty="0"/>
-          </a:p>
-        </p:txBody>
-      </p:sp>
-      <p:sp>
-        <p:nvSpPr>
-          <p:cNvPr id="3" name="Content Placeholder 2">
-            <a:extLst>
-              <a:ext uri="{FF2B5EF4-FFF2-40B4-BE49-F238E27FC236}">
-                <a16:creationId xmlns:a16="http://schemas.microsoft.com/office/drawing/2014/main" id="{C33A9121-07F5-220F-2DB1-F0054155A400}"/>
-              </a:ext>
-            </a:extLst>
-          </p:cNvPr>
-          <p:cNvSpPr>
-            <a:spLocks noGrp="1"/>
-          </p:cNvSpPr>
-          <p:nvPr>
-            <p:ph idx="1"/>
-          </p:nvPr>
-        </p:nvSpPr>
-        <p:spPr/>
-        <p:txBody>
-          <a:bodyPr/>
-          <a:lstStyle/>
-          <a:p>
-            <a:endParaRPr lang="en-GB"/>
           </a:p>
         </p:txBody>
       </p:sp>
@@ -11144,7 +11119,7 @@
           <a:p>
             <a:r>
               <a:rPr lang="en-US" dirty="0"/>
-              <a:t>H₁ (Positive): Defendant HAS a disease</a:t>
+              <a:t>H₁ (Positive): Patient HAS a disease</a:t>
             </a:r>
           </a:p>
           <a:p>
@@ -11327,7 +11302,7 @@
           <a:p>
             <a:r>
               <a:rPr lang="en-US" sz="1600" dirty="0"/>
-              <a:t>H₁ (Positive): Defendant HAS a disease</a:t>
+              <a:t>H₁ (Positive): Patient HAS a disease</a:t>
             </a:r>
           </a:p>
           <a:p>
@@ -14835,7 +14810,15 @@
           <a:p>
             <a:r>
               <a:rPr lang="en-US" dirty="0"/>
-              <a:t>H₁ (Positive): Defendant HAS a disease</a:t>
+              <a:t>H₁ (Positive</a:t>
+            </a:r>
+            <a:r>
+              <a:rPr lang="en-US"/>
+              <a:t>): Patient </a:t>
+            </a:r>
+            <a:r>
+              <a:rPr lang="en-US" dirty="0"/>
+              <a:t>HAS a disease</a:t>
             </a:r>
           </a:p>
           <a:p>
@@ -34101,33 +34084,6 @@
           </a:p>
         </p:txBody>
       </p:sp>
-      <p:sp>
-        <p:nvSpPr>
-          <p:cNvPr id="6" name="Content Placeholder 5">
-            <a:extLst>
-              <a:ext uri="{FF2B5EF4-FFF2-40B4-BE49-F238E27FC236}">
-                <a16:creationId xmlns:a16="http://schemas.microsoft.com/office/drawing/2014/main" id="{A1CEF155-CAD5-100F-3EBE-2B305D2663CB}"/>
-              </a:ext>
-            </a:extLst>
-          </p:cNvPr>
-          <p:cNvSpPr>
-            <a:spLocks noGrp="1"/>
-          </p:cNvSpPr>
-          <p:nvPr>
-            <p:ph sz="half" idx="2"/>
-          </p:nvPr>
-        </p:nvSpPr>
-        <p:spPr/>
-        <p:txBody>
-          <a:bodyPr>
-            <a:normAutofit fontScale="92500" lnSpcReduction="20000"/>
-          </a:bodyPr>
-          <a:lstStyle/>
-          <a:p>
-            <a:endParaRPr lang="en-GB"/>
-          </a:p>
-        </p:txBody>
-      </p:sp>
       <p:pic>
         <p:nvPicPr>
           <p:cNvPr id="5" name="Picture 4">

</xml_diff>